<commit_message>
update with run instructions
</commit_message>
<xml_diff>
--- a/Rebus.pptx
+++ b/Rebus.pptx
@@ -6,7 +6,6 @@
   </p:sldMasterIdLst>
   <p:sldIdLst>
     <p:sldId id="256" r:id="rId7"/>
-    <p:sldId id="257" r:id="rId8"/>
   </p:sldIdLst>
   <p:sldSz cx="9144000" cy="6858000" type="screen4x3"/>
   <p:notesSz cx="6858000" cy="9144000"/>
@@ -3120,40 +3119,16 @@
           </a:p>
         </p:txBody>
       </p:sp>
-      <p:pic>
-        <p:nvPicPr>
-          <p:cNvPr id="3" name="Picture 2" descr="image319.png"/>
-          <p:cNvPicPr>
-            <a:picLocks noChangeAspect="1"/>
-          </p:cNvPicPr>
+      <p:sp>
+        <p:nvSpPr>
+          <p:cNvPr id="3" name="TextBox 2"/>
+          <p:cNvSpPr txBox="1"/>
           <p:nvPr/>
-        </p:nvPicPr>
-        <p:blipFill>
-          <a:blip r:embed="rId2"/>
-          <a:stretch>
-            <a:fillRect/>
-          </a:stretch>
-        </p:blipFill>
+        </p:nvSpPr>
         <p:spPr>
           <a:xfrm>
             <a:off x="228600" y="1371600"/>
-            <a:ext cx="1651571" cy="1371600"/>
-          </a:xfrm>
-          <a:prstGeom prst="rect">
-            <a:avLst/>
-          </a:prstGeom>
-        </p:spPr>
-      </p:pic>
-      <p:sp>
-        <p:nvSpPr>
-          <p:cNvPr id="4" name="TextBox 3"/>
-          <p:cNvSpPr txBox="1"/>
-          <p:nvPr/>
-        </p:nvSpPr>
-        <p:spPr>
-          <a:xfrm>
-            <a:off x="228600" y="914400"/>
-            <a:ext cx="914400" cy="457200"/>
+            <a:ext cx="1371600" cy="1371600"/>
           </a:xfrm>
           <a:prstGeom prst="rect">
             <a:avLst/>
@@ -3167,45 +3142,57 @@
           <a:lstStyle/>
           <a:p>
             <a:r>
-              <a:t>4/6</a:t>
-            </a:r>
-          </a:p>
-        </p:txBody>
-      </p:sp>
-      <p:pic>
-        <p:nvPicPr>
-          <p:cNvPr id="5" name="Picture 4" descr="troublesome_woman_gayyaaLi.png"/>
-          <p:cNvPicPr>
-            <a:picLocks noChangeAspect="1"/>
-          </p:cNvPicPr>
+              <a:rPr sz="4800" b="1">
+                <a:latin typeface="Calibri"/>
+              </a:rPr>
+              <a:t>l</a:t>
+            </a:r>
+          </a:p>
+        </p:txBody>
+      </p:sp>
+      <p:sp>
+        <p:nvSpPr>
+          <p:cNvPr id="4" name="TextBox 3"/>
+          <p:cNvSpPr txBox="1"/>
           <p:nvPr/>
-        </p:nvPicPr>
-        <p:blipFill>
-          <a:blip r:embed="rId3"/>
-          <a:stretch>
-            <a:fillRect/>
-          </a:stretch>
-        </p:blipFill>
+        </p:nvSpPr>
         <p:spPr>
           <a:xfrm>
-            <a:off x="2286000" y="1371600"/>
-            <a:ext cx="1600200" cy="1371600"/>
+            <a:off x="228600" y="914400"/>
+            <a:ext cx="914400" cy="320040"/>
           </a:xfrm>
           <a:prstGeom prst="rect">
             <a:avLst/>
           </a:prstGeom>
+          <a:noFill/>
+          <a:ln>
+            <a:solidFill>
+              <a:srgbClr val="000000"/>
+            </a:solidFill>
+          </a:ln>
         </p:spPr>
-      </p:pic>
-      <p:sp>
-        <p:nvSpPr>
-          <p:cNvPr id="6" name="TextBox 5"/>
+        <p:txBody>
+          <a:bodyPr wrap="none">
+            <a:spAutoFit/>
+          </a:bodyPr>
+          <a:lstStyle/>
+          <a:p>
+            <a:r>
+              <a:t>6/17</a:t>
+            </a:r>
+          </a:p>
+        </p:txBody>
+      </p:sp>
+      <p:sp>
+        <p:nvSpPr>
+          <p:cNvPr id="5" name="TextBox 4"/>
           <p:cNvSpPr txBox="1"/>
           <p:nvPr/>
         </p:nvSpPr>
         <p:spPr>
           <a:xfrm>
-            <a:off x="2286000" y="914400"/>
-            <a:ext cx="914400" cy="457200"/>
+            <a:off x="1600200" y="1371600"/>
+            <a:ext cx="1371600" cy="1371600"/>
           </a:xfrm>
           <a:prstGeom prst="rect">
             <a:avLst/>
@@ -3219,45 +3206,57 @@
           <a:lstStyle/>
           <a:p>
             <a:r>
-              <a:t>7/17</a:t>
-            </a:r>
-          </a:p>
-        </p:txBody>
-      </p:sp>
-      <p:pic>
-        <p:nvPicPr>
-          <p:cNvPr id="7" name="Picture 6" descr="image413.png"/>
-          <p:cNvPicPr>
-            <a:picLocks noChangeAspect="1"/>
-          </p:cNvPicPr>
+              <a:rPr sz="4800" b="1">
+                <a:latin typeface="Calibri"/>
+              </a:rPr>
+              <a:t>o</a:t>
+            </a:r>
+          </a:p>
+        </p:txBody>
+      </p:sp>
+      <p:sp>
+        <p:nvSpPr>
+          <p:cNvPr id="6" name="TextBox 5"/>
+          <p:cNvSpPr txBox="1"/>
           <p:nvPr/>
-        </p:nvPicPr>
-        <p:blipFill>
-          <a:blip r:embed="rId4"/>
-          <a:stretch>
-            <a:fillRect/>
-          </a:stretch>
-        </p:blipFill>
+        </p:nvSpPr>
         <p:spPr>
           <a:xfrm>
-            <a:off x="4343400" y="1371600"/>
-            <a:ext cx="2222256" cy="1371600"/>
+            <a:off x="1600200" y="914400"/>
+            <a:ext cx="914400" cy="320040"/>
           </a:xfrm>
           <a:prstGeom prst="rect">
             <a:avLst/>
           </a:prstGeom>
+          <a:noFill/>
+          <a:ln>
+            <a:solidFill>
+              <a:srgbClr val="000000"/>
+            </a:solidFill>
+          </a:ln>
         </p:spPr>
-      </p:pic>
-      <p:sp>
-        <p:nvSpPr>
-          <p:cNvPr id="8" name="TextBox 7"/>
+        <p:txBody>
+          <a:bodyPr wrap="none">
+            <a:spAutoFit/>
+          </a:bodyPr>
+          <a:lstStyle/>
+          <a:p>
+            <a:r>
+              <a:t>1/9</a:t>
+            </a:r>
+          </a:p>
+        </p:txBody>
+      </p:sp>
+      <p:sp>
+        <p:nvSpPr>
+          <p:cNvPr id="7" name="TextBox 6"/>
           <p:cNvSpPr txBox="1"/>
           <p:nvPr/>
         </p:nvSpPr>
         <p:spPr>
           <a:xfrm>
-            <a:off x="4343400" y="914400"/>
-            <a:ext cx="914400" cy="457200"/>
+            <a:off x="2971800" y="1371600"/>
+            <a:ext cx="1371600" cy="1371600"/>
           </a:xfrm>
           <a:prstGeom prst="rect">
             <a:avLst/>
@@ -3271,45 +3270,57 @@
           <a:lstStyle/>
           <a:p>
             <a:r>
-              <a:t>2/5</a:t>
-            </a:r>
-          </a:p>
-        </p:txBody>
-      </p:sp>
-      <p:pic>
-        <p:nvPicPr>
-          <p:cNvPr id="9" name="Picture 8" descr="image725.png"/>
-          <p:cNvPicPr>
-            <a:picLocks noChangeAspect="1"/>
-          </p:cNvPicPr>
+              <a:rPr sz="4800" b="1">
+                <a:latin typeface="Calibri"/>
+              </a:rPr>
+              <a:t>n</a:t>
+            </a:r>
+          </a:p>
+        </p:txBody>
+      </p:sp>
+      <p:sp>
+        <p:nvSpPr>
+          <p:cNvPr id="8" name="TextBox 7"/>
+          <p:cNvSpPr txBox="1"/>
           <p:nvPr/>
-        </p:nvPicPr>
-        <p:blipFill>
-          <a:blip r:embed="rId5"/>
-          <a:stretch>
-            <a:fillRect/>
-          </a:stretch>
-        </p:blipFill>
+        </p:nvSpPr>
         <p:spPr>
           <a:xfrm>
-            <a:off x="6400800" y="1371600"/>
-            <a:ext cx="2227903" cy="1371600"/>
+            <a:off x="2971800" y="914400"/>
+            <a:ext cx="914400" cy="320040"/>
           </a:xfrm>
           <a:prstGeom prst="rect">
             <a:avLst/>
           </a:prstGeom>
+          <a:noFill/>
+          <a:ln>
+            <a:solidFill>
+              <a:srgbClr val="000000"/>
+            </a:solidFill>
+          </a:ln>
         </p:spPr>
-      </p:pic>
-      <p:sp>
-        <p:nvSpPr>
-          <p:cNvPr id="10" name="TextBox 9"/>
+        <p:txBody>
+          <a:bodyPr wrap="none">
+            <a:spAutoFit/>
+          </a:bodyPr>
+          <a:lstStyle/>
+          <a:p>
+            <a:r>
+              <a:t>6/13</a:t>
+            </a:r>
+          </a:p>
+        </p:txBody>
+      </p:sp>
+      <p:sp>
+        <p:nvSpPr>
+          <p:cNvPr id="9" name="TextBox 8"/>
           <p:cNvSpPr txBox="1"/>
           <p:nvPr/>
         </p:nvSpPr>
         <p:spPr>
           <a:xfrm>
-            <a:off x="6400800" y="914400"/>
-            <a:ext cx="914400" cy="457200"/>
+            <a:off x="4343400" y="1371600"/>
+            <a:ext cx="1371600" cy="1371600"/>
           </a:xfrm>
           <a:prstGeom prst="rect">
             <a:avLst/>
@@ -3323,45 +3334,57 @@
           <a:lstStyle/>
           <a:p>
             <a:r>
-              <a:t>4/10</a:t>
-            </a:r>
-          </a:p>
-        </p:txBody>
-      </p:sp>
-      <p:pic>
-        <p:nvPicPr>
-          <p:cNvPr id="11" name="Picture 10" descr="foolish_person.PNG"/>
-          <p:cNvPicPr>
-            <a:picLocks noChangeAspect="1"/>
-          </p:cNvPicPr>
+              <a:rPr sz="4800" b="1">
+                <a:latin typeface="Calibri"/>
+              </a:rPr>
+              <a:t>g</a:t>
+            </a:r>
+          </a:p>
+        </p:txBody>
+      </p:sp>
+      <p:sp>
+        <p:nvSpPr>
+          <p:cNvPr id="10" name="TextBox 9"/>
+          <p:cNvSpPr txBox="1"/>
           <p:nvPr/>
-        </p:nvPicPr>
-        <p:blipFill>
-          <a:blip r:embed="rId6"/>
-          <a:stretch>
-            <a:fillRect/>
-          </a:stretch>
-        </p:blipFill>
+        </p:nvSpPr>
         <p:spPr>
           <a:xfrm>
-            <a:off x="228600" y="3543300"/>
-            <a:ext cx="1998552" cy="1371600"/>
+            <a:off x="4343400" y="914400"/>
+            <a:ext cx="914400" cy="320040"/>
           </a:xfrm>
           <a:prstGeom prst="rect">
             <a:avLst/>
           </a:prstGeom>
+          <a:noFill/>
+          <a:ln>
+            <a:solidFill>
+              <a:srgbClr val="000000"/>
+            </a:solidFill>
+          </a:ln>
         </p:spPr>
-      </p:pic>
-      <p:sp>
-        <p:nvSpPr>
-          <p:cNvPr id="12" name="TextBox 11"/>
+        <p:txBody>
+          <a:bodyPr wrap="none">
+            <a:spAutoFit/>
+          </a:bodyPr>
+          <a:lstStyle/>
+          <a:p>
+            <a:r>
+              <a:t>6/23</a:t>
+            </a:r>
+          </a:p>
+        </p:txBody>
+      </p:sp>
+      <p:sp>
+        <p:nvSpPr>
+          <p:cNvPr id="11" name="TextBox 10"/>
           <p:cNvSpPr txBox="1"/>
           <p:nvPr/>
         </p:nvSpPr>
         <p:spPr>
           <a:xfrm>
-            <a:off x="228600" y="3086100"/>
-            <a:ext cx="914400" cy="457200"/>
+            <a:off x="5715000" y="1371600"/>
+            <a:ext cx="1371600" cy="1371600"/>
           </a:xfrm>
           <a:prstGeom prst="rect">
             <a:avLst/>
@@ -3375,45 +3398,57 @@
           <a:lstStyle/>
           <a:p>
             <a:r>
-              <a:t>2/4</a:t>
-            </a:r>
-          </a:p>
-        </p:txBody>
-      </p:sp>
-      <p:pic>
-        <p:nvPicPr>
-          <p:cNvPr id="13" name="Picture 12" descr="image708.png"/>
-          <p:cNvPicPr>
-            <a:picLocks noChangeAspect="1"/>
-          </p:cNvPicPr>
+              <a:rPr sz="4800" b="1">
+                <a:latin typeface="Calibri"/>
+              </a:rPr>
+              <a:t>w</a:t>
+            </a:r>
+          </a:p>
+        </p:txBody>
+      </p:sp>
+      <p:sp>
+        <p:nvSpPr>
+          <p:cNvPr id="12" name="TextBox 11"/>
+          <p:cNvSpPr txBox="1"/>
           <p:nvPr/>
-        </p:nvPicPr>
-        <p:blipFill>
-          <a:blip r:embed="rId7"/>
-          <a:stretch>
-            <a:fillRect/>
-          </a:stretch>
-        </p:blipFill>
+        </p:nvSpPr>
         <p:spPr>
           <a:xfrm>
-            <a:off x="2286000" y="3543300"/>
-            <a:ext cx="1738745" cy="1371600"/>
+            <a:off x="5715000" y="914400"/>
+            <a:ext cx="914400" cy="320040"/>
           </a:xfrm>
           <a:prstGeom prst="rect">
             <a:avLst/>
           </a:prstGeom>
+          <a:noFill/>
+          <a:ln>
+            <a:solidFill>
+              <a:srgbClr val="000000"/>
+            </a:solidFill>
+          </a:ln>
         </p:spPr>
-      </p:pic>
-      <p:sp>
-        <p:nvSpPr>
-          <p:cNvPr id="14" name="TextBox 13"/>
+        <p:txBody>
+          <a:bodyPr wrap="none">
+            <a:spAutoFit/>
+          </a:bodyPr>
+          <a:lstStyle/>
+          <a:p>
+            <a:r>
+              <a:t>9/9</a:t>
+            </a:r>
+          </a:p>
+        </p:txBody>
+      </p:sp>
+      <p:sp>
+        <p:nvSpPr>
+          <p:cNvPr id="13" name="TextBox 12"/>
           <p:cNvSpPr txBox="1"/>
           <p:nvPr/>
         </p:nvSpPr>
         <p:spPr>
           <a:xfrm>
-            <a:off x="2286000" y="3086100"/>
-            <a:ext cx="914400" cy="457200"/>
+            <a:off x="7086600" y="1371600"/>
+            <a:ext cx="1371600" cy="1371600"/>
           </a:xfrm>
           <a:prstGeom prst="rect">
             <a:avLst/>
@@ -3427,45 +3462,57 @@
           <a:lstStyle/>
           <a:p>
             <a:r>
-              <a:t>3/6</a:t>
-            </a:r>
-          </a:p>
-        </p:txBody>
-      </p:sp>
-      <p:pic>
-        <p:nvPicPr>
-          <p:cNvPr id="15" name="Picture 14" descr="student.PNG"/>
-          <p:cNvPicPr>
-            <a:picLocks noChangeAspect="1"/>
-          </p:cNvPicPr>
+              <a:rPr sz="4800" b="1">
+                <a:latin typeface="Calibri"/>
+              </a:rPr>
+              <a:t>o</a:t>
+            </a:r>
+          </a:p>
+        </p:txBody>
+      </p:sp>
+      <p:sp>
+        <p:nvSpPr>
+          <p:cNvPr id="14" name="TextBox 13"/>
+          <p:cNvSpPr txBox="1"/>
           <p:nvPr/>
-        </p:nvPicPr>
-        <p:blipFill>
-          <a:blip r:embed="rId8"/>
-          <a:stretch>
-            <a:fillRect/>
-          </a:stretch>
-        </p:blipFill>
+        </p:nvSpPr>
         <p:spPr>
           <a:xfrm>
-            <a:off x="4343400" y="3543300"/>
-            <a:ext cx="2058553" cy="1371600"/>
+            <a:off x="7086600" y="914400"/>
+            <a:ext cx="914400" cy="320040"/>
           </a:xfrm>
           <a:prstGeom prst="rect">
             <a:avLst/>
           </a:prstGeom>
+          <a:noFill/>
+          <a:ln>
+            <a:solidFill>
+              <a:srgbClr val="000000"/>
+            </a:solidFill>
+          </a:ln>
         </p:spPr>
-      </p:pic>
-      <p:sp>
-        <p:nvSpPr>
-          <p:cNvPr id="16" name="TextBox 15"/>
+        <p:txBody>
+          <a:bodyPr wrap="none">
+            <a:spAutoFit/>
+          </a:bodyPr>
+          <a:lstStyle/>
+          <a:p>
+            <a:r>
+              <a:t>2/6</a:t>
+            </a:r>
+          </a:p>
+        </p:txBody>
+      </p:sp>
+      <p:sp>
+        <p:nvSpPr>
+          <p:cNvPr id="15" name="TextBox 14"/>
           <p:cNvSpPr txBox="1"/>
           <p:nvPr/>
         </p:nvSpPr>
         <p:spPr>
           <a:xfrm>
-            <a:off x="4343400" y="3086100"/>
-            <a:ext cx="914400" cy="457200"/>
+            <a:off x="228600" y="3543300"/>
+            <a:ext cx="1371600" cy="1371600"/>
           </a:xfrm>
           <a:prstGeom prst="rect">
             <a:avLst/>
@@ -3479,45 +3526,57 @@
           <a:lstStyle/>
           <a:p>
             <a:r>
-              <a:t>2/7</a:t>
-            </a:r>
-          </a:p>
-        </p:txBody>
-      </p:sp>
-      <p:pic>
-        <p:nvPicPr>
-          <p:cNvPr id="17" name="Picture 16" descr="image150.png"/>
-          <p:cNvPicPr>
-            <a:picLocks noChangeAspect="1"/>
-          </p:cNvPicPr>
+              <a:rPr sz="4800" b="1">
+                <a:latin typeface="Calibri"/>
+              </a:rPr>
+              <a:t>r</a:t>
+            </a:r>
+          </a:p>
+        </p:txBody>
+      </p:sp>
+      <p:sp>
+        <p:nvSpPr>
+          <p:cNvPr id="16" name="TextBox 15"/>
+          <p:cNvSpPr txBox="1"/>
           <p:nvPr/>
-        </p:nvPicPr>
-        <p:blipFill>
-          <a:blip r:embed="rId9"/>
-          <a:stretch>
-            <a:fillRect/>
-          </a:stretch>
-        </p:blipFill>
+        </p:nvSpPr>
         <p:spPr>
           <a:xfrm>
-            <a:off x="6400800" y="3543300"/>
-            <a:ext cx="1494890" cy="1371600"/>
+            <a:off x="228600" y="3086100"/>
+            <a:ext cx="914400" cy="320040"/>
           </a:xfrm>
           <a:prstGeom prst="rect">
             <a:avLst/>
           </a:prstGeom>
+          <a:noFill/>
+          <a:ln>
+            <a:solidFill>
+              <a:srgbClr val="000000"/>
+            </a:solidFill>
+          </a:ln>
         </p:spPr>
-      </p:pic>
-      <p:sp>
-        <p:nvSpPr>
-          <p:cNvPr id="18" name="TextBox 17"/>
+        <p:txBody>
+          <a:bodyPr wrap="none">
+            <a:spAutoFit/>
+          </a:bodyPr>
+          <a:lstStyle/>
+          <a:p>
+            <a:r>
+              <a:t>6/6</a:t>
+            </a:r>
+          </a:p>
+        </p:txBody>
+      </p:sp>
+      <p:sp>
+        <p:nvSpPr>
+          <p:cNvPr id="17" name="TextBox 16"/>
           <p:cNvSpPr txBox="1"/>
           <p:nvPr/>
         </p:nvSpPr>
         <p:spPr>
           <a:xfrm>
-            <a:off x="6400800" y="3086100"/>
-            <a:ext cx="914400" cy="457200"/>
+            <a:off x="1600200" y="3543300"/>
+            <a:ext cx="1371600" cy="1371600"/>
           </a:xfrm>
           <a:prstGeom prst="rect">
             <a:avLst/>
@@ -3531,65 +3590,44 @@
           <a:lstStyle/>
           <a:p>
             <a:r>
-              <a:t>9/9</a:t>
-            </a:r>
-          </a:p>
-        </p:txBody>
-      </p:sp>
-    </p:spTree>
-  </p:cSld>
-  <p:clrMapOvr>
-    <a:masterClrMapping/>
-  </p:clrMapOvr>
-</p:sld>
-</file>
-
-<file path=ppt/slides/slide2.xml><?xml version="1.0" encoding="utf-8"?>
-<p:sld xmlns:a="http://schemas.openxmlformats.org/drawingml/2006/main" xmlns:p="http://schemas.openxmlformats.org/presentationml/2006/main" xmlns:r="http://schemas.openxmlformats.org/officeDocument/2006/relationships">
-  <p:cSld>
-    <p:spTree>
-      <p:nvGrpSpPr>
-        <p:cNvPr id="1" name=""/>
-        <p:cNvGrpSpPr/>
-        <p:nvPr/>
-      </p:nvGrpSpPr>
-      <p:grpSpPr/>
-      <p:sp>
-        <p:nvSpPr>
-          <p:cNvPr id="2" name="TextBox 1"/>
+              <a:rPr sz="4800" b="1">
+                <a:latin typeface="Calibri"/>
+              </a:rPr>
+              <a:t>d</a:t>
+            </a:r>
+          </a:p>
+        </p:txBody>
+      </p:sp>
+      <p:sp>
+        <p:nvSpPr>
+          <p:cNvPr id="18" name="TextBox 17"/>
           <p:cNvSpPr txBox="1"/>
           <p:nvPr/>
         </p:nvSpPr>
         <p:spPr>
           <a:xfrm>
-            <a:off x="457200" y="457200"/>
-            <a:ext cx="8229600" cy="5943600"/>
+            <a:off x="1600200" y="3086100"/>
+            <a:ext cx="914400" cy="320040"/>
           </a:xfrm>
           <a:prstGeom prst="rect">
             <a:avLst/>
           </a:prstGeom>
           <a:noFill/>
+          <a:ln>
+            <a:solidFill>
+              <a:srgbClr val="000000"/>
+            </a:solidFill>
+          </a:ln>
         </p:spPr>
         <p:txBody>
-          <a:bodyPr wrap="square">
-            <a:noAutofit/>
+          <a:bodyPr wrap="none">
+            <a:spAutoFit/>
           </a:bodyPr>
           <a:lstStyle/>
           <a:p>
-            <a:endParaRPr sz="1800" b="0" i="0">
-              <a:latin typeface="Calibri"/>
-            </a:endParaRPr>
-          </a:p>
-          <a:p>
-            <a:r>
-              <a:rPr sz="1800" b="0" i="0">
-                <a:latin typeface="Calibri"/>
-              </a:rPr>
-              <a:t>#1 (4/6) kathak | (7/17) troublesome woman | (2/5) plane | (4/10) bouldering | (2/4) fool | (3/6) bricks | (2/7) student | (9/9) triangles</a:t>
-            </a:r>
-            <a:endParaRPr sz="1800" b="0" i="0">
-              <a:latin typeface="Calibri"/>
-            </a:endParaRPr>
+            <a:r>
+              <a:t>3/13</a:t>
+            </a:r>
           </a:p>
         </p:txBody>
       </p:sp>

</xml_diff>